<commit_message>
Dodavanje prezentacije o projektu
</commit_message>
<xml_diff>
--- a/PrezentacijaProjekata_LeteciMedvjedici_SpotiPicker.pptx
+++ b/PrezentacijaProjekata_LeteciMedvjedici_SpotiPicker.pptx
@@ -11,14 +11,14 @@
     <p:sldId id="256" r:id="rId2"/>
     <p:sldId id="257" r:id="rId3"/>
     <p:sldId id="258" r:id="rId4"/>
-    <p:sldId id="259" r:id="rId5"/>
+    <p:sldId id="267" r:id="rId5"/>
     <p:sldId id="265" r:id="rId6"/>
-    <p:sldId id="260" r:id="rId7"/>
-    <p:sldId id="266" r:id="rId8"/>
-    <p:sldId id="261" r:id="rId9"/>
-    <p:sldId id="262" r:id="rId10"/>
+    <p:sldId id="266" r:id="rId7"/>
+    <p:sldId id="261" r:id="rId8"/>
+    <p:sldId id="262" r:id="rId9"/>
+    <p:sldId id="269" r:id="rId10"/>
     <p:sldId id="263" r:id="rId11"/>
-    <p:sldId id="264" r:id="rId12"/>
+    <p:sldId id="268" r:id="rId12"/>
   </p:sldIdLst>
   <p:sldSz cx="9144000" cy="6858000" type="screen4x3"/>
   <p:notesSz cx="6858000" cy="9144000"/>
@@ -207,7 +207,7 @@
           <a:p>
             <a:fld id="{A57596D4-CB16-4BAD-83F6-7E8077D61F81}" type="datetimeFigureOut">
               <a:rPr lang="hr-HR" smtClean="0"/>
-              <a:t>18.1.2024.</a:t>
+              <a:t>22.1.2024.</a:t>
             </a:fld>
             <a:endParaRPr lang="hr-HR"/>
           </a:p>
@@ -3938,6 +3938,218 @@
     <p:extLst>
       <p:ext uri="{BB962C8B-B14F-4D97-AF65-F5344CB8AC3E}">
         <p14:creationId xmlns:p14="http://schemas.microsoft.com/office/powerpoint/2010/main" val="3800307980"/>
+      </p:ext>
+    </p:extLst>
+  </p:cSld>
+  <p:clrMapOvr>
+    <a:masterClrMapping/>
+  </p:clrMapOvr>
+</p:notes>
+</file>
+
+<file path=ppt/notesSlides/notesSlide2.xml><?xml version="1.0" encoding="utf-8"?>
+<p:notes xmlns:a="http://schemas.openxmlformats.org/drawingml/2006/main" xmlns:r="http://schemas.openxmlformats.org/officeDocument/2006/relationships" xmlns:p="http://schemas.openxmlformats.org/presentationml/2006/main">
+  <p:cSld>
+    <p:spTree>
+      <p:nvGrpSpPr>
+        <p:cNvPr id="1" name=""/>
+        <p:cNvGrpSpPr/>
+        <p:nvPr/>
+      </p:nvGrpSpPr>
+      <p:grpSpPr>
+        <a:xfrm>
+          <a:off x="0" y="0"/>
+          <a:ext cx="0" cy="0"/>
+          <a:chOff x="0" y="0"/>
+          <a:chExt cx="0" cy="0"/>
+        </a:xfrm>
+      </p:grpSpPr>
+      <p:sp>
+        <p:nvSpPr>
+          <p:cNvPr id="2" name="Slide Image Placeholder 1"/>
+          <p:cNvSpPr>
+            <a:spLocks noGrp="1" noRot="1" noChangeAspect="1"/>
+          </p:cNvSpPr>
+          <p:nvPr>
+            <p:ph type="sldImg"/>
+          </p:nvPr>
+        </p:nvSpPr>
+        <p:spPr/>
+      </p:sp>
+      <p:sp>
+        <p:nvSpPr>
+          <p:cNvPr id="3" name="Notes Placeholder 2"/>
+          <p:cNvSpPr>
+            <a:spLocks noGrp="1"/>
+          </p:cNvSpPr>
+          <p:nvPr>
+            <p:ph type="body" idx="1"/>
+          </p:nvPr>
+        </p:nvSpPr>
+        <p:spPr/>
+        <p:txBody>
+          <a:bodyPr/>
+          <a:lstStyle/>
+          <a:p>
+            <a:r>
+              <a:rPr lang="hr-HR" dirty="0"/>
+              <a:t>Popis svih korištenih alata (za izradu programske podrške, dokumentacije, komunikaciju i upravljanje)</a:t>
+            </a:r>
+          </a:p>
+          <a:p>
+            <a:pPr lvl="1"/>
+            <a:r>
+              <a:rPr lang="hr-HR" dirty="0"/>
+              <a:t>Poželjno staviti linkove za web stranice pojedinih</a:t>
+            </a:r>
+          </a:p>
+          <a:p>
+            <a:pPr marL="457200" lvl="1" indent="0">
+              <a:buNone/>
+            </a:pPr>
+            <a:endParaRPr lang="hr-HR" dirty="0"/>
+          </a:p>
+          <a:p>
+            <a:r>
+              <a:rPr lang="hr-HR" dirty="0"/>
+              <a:t>Korišteni programski jezici i tehnologije</a:t>
+            </a:r>
+          </a:p>
+          <a:p>
+            <a:pPr lvl="1"/>
+            <a:r>
+              <a:rPr lang="hr-HR" dirty="0"/>
+              <a:t>Naznačiti što je korišteno za front end a što za back end</a:t>
+            </a:r>
+          </a:p>
+          <a:p>
+            <a:endParaRPr lang="en-US" dirty="0"/>
+          </a:p>
+        </p:txBody>
+      </p:sp>
+      <p:sp>
+        <p:nvSpPr>
+          <p:cNvPr id="4" name="Slide Number Placeholder 3"/>
+          <p:cNvSpPr>
+            <a:spLocks noGrp="1"/>
+          </p:cNvSpPr>
+          <p:nvPr>
+            <p:ph type="sldNum" sz="quarter" idx="5"/>
+          </p:nvPr>
+        </p:nvSpPr>
+        <p:spPr/>
+        <p:txBody>
+          <a:bodyPr/>
+          <a:lstStyle/>
+          <a:p>
+            <a:fld id="{6945738E-9CB8-443D-AC33-32367D542132}" type="slidenum">
+              <a:rPr lang="hr-HR" smtClean="0"/>
+              <a:t>6</a:t>
+            </a:fld>
+            <a:endParaRPr lang="hr-HR"/>
+          </a:p>
+        </p:txBody>
+      </p:sp>
+    </p:spTree>
+    <p:extLst>
+      <p:ext uri="{BB962C8B-B14F-4D97-AF65-F5344CB8AC3E}">
+        <p14:creationId xmlns:p14="http://schemas.microsoft.com/office/powerpoint/2010/main" val="861530863"/>
+      </p:ext>
+    </p:extLst>
+  </p:cSld>
+  <p:clrMapOvr>
+    <a:masterClrMapping/>
+  </p:clrMapOvr>
+</p:notes>
+</file>
+
+<file path=ppt/notesSlides/notesSlide3.xml><?xml version="1.0" encoding="utf-8"?>
+<p:notes xmlns:a="http://schemas.openxmlformats.org/drawingml/2006/main" xmlns:r="http://schemas.openxmlformats.org/officeDocument/2006/relationships" xmlns:p="http://schemas.openxmlformats.org/presentationml/2006/main">
+  <p:cSld>
+    <p:spTree>
+      <p:nvGrpSpPr>
+        <p:cNvPr id="1" name=""/>
+        <p:cNvGrpSpPr/>
+        <p:nvPr/>
+      </p:nvGrpSpPr>
+      <p:grpSpPr>
+        <a:xfrm>
+          <a:off x="0" y="0"/>
+          <a:ext cx="0" cy="0"/>
+          <a:chOff x="0" y="0"/>
+          <a:chExt cx="0" cy="0"/>
+        </a:xfrm>
+      </p:grpSpPr>
+      <p:sp>
+        <p:nvSpPr>
+          <p:cNvPr id="2" name="Slide Image Placeholder 1"/>
+          <p:cNvSpPr>
+            <a:spLocks noGrp="1" noRot="1" noChangeAspect="1"/>
+          </p:cNvSpPr>
+          <p:nvPr>
+            <p:ph type="sldImg"/>
+          </p:nvPr>
+        </p:nvSpPr>
+        <p:spPr/>
+      </p:sp>
+      <p:sp>
+        <p:nvSpPr>
+          <p:cNvPr id="3" name="Notes Placeholder 2"/>
+          <p:cNvSpPr>
+            <a:spLocks noGrp="1"/>
+          </p:cNvSpPr>
+          <p:nvPr>
+            <p:ph type="body" idx="1"/>
+          </p:nvPr>
+        </p:nvSpPr>
+        <p:spPr/>
+        <p:txBody>
+          <a:bodyPr/>
+          <a:lstStyle/>
+          <a:p>
+            <a:r>
+              <a:rPr lang="hr-HR" dirty="0"/>
+              <a:t>Na visokoj razini apstrakcije</a:t>
+            </a:r>
+          </a:p>
+          <a:p>
+            <a:r>
+              <a:rPr lang="hr-HR" dirty="0"/>
+              <a:t>Obavezno staviti dijagram </a:t>
+            </a:r>
+          </a:p>
+          <a:p>
+            <a:endParaRPr lang="en-US" dirty="0"/>
+          </a:p>
+        </p:txBody>
+      </p:sp>
+      <p:sp>
+        <p:nvSpPr>
+          <p:cNvPr id="4" name="Slide Number Placeholder 3"/>
+          <p:cNvSpPr>
+            <a:spLocks noGrp="1"/>
+          </p:cNvSpPr>
+          <p:nvPr>
+            <p:ph type="sldNum" sz="quarter" idx="5"/>
+          </p:nvPr>
+        </p:nvSpPr>
+        <p:spPr/>
+        <p:txBody>
+          <a:bodyPr/>
+          <a:lstStyle/>
+          <a:p>
+            <a:fld id="{6945738E-9CB8-443D-AC33-32367D542132}" type="slidenum">
+              <a:rPr lang="hr-HR" smtClean="0"/>
+              <a:t>7</a:t>
+            </a:fld>
+            <a:endParaRPr lang="hr-HR"/>
+          </a:p>
+        </p:txBody>
+      </p:sp>
+    </p:spTree>
+    <p:extLst>
+      <p:ext uri="{BB962C8B-B14F-4D97-AF65-F5344CB8AC3E}">
+        <p14:creationId xmlns:p14="http://schemas.microsoft.com/office/powerpoint/2010/main" val="2042020858"/>
       </p:ext>
     </p:extLst>
   </p:cSld>
@@ -7376,7 +7588,7 @@
           <a:p>
             <a:fld id="{E46E8F5E-7C26-4DBA-9CDF-6E3092DFB447}" type="datetime1">
               <a:rPr lang="hr-HR" smtClean="0"/>
-              <a:t>18.1.2024.</a:t>
+              <a:t>22.1.2024.</a:t>
             </a:fld>
             <a:endParaRPr lang="hr-HR"/>
           </a:p>
@@ -7602,7 +7814,7 @@
           <a:p>
             <a:fld id="{E46E8F5E-7C26-4DBA-9CDF-6E3092DFB447}" type="datetime1">
               <a:rPr lang="hr-HR" smtClean="0"/>
-              <a:t>18.1.2024.</a:t>
+              <a:t>22.1.2024.</a:t>
             </a:fld>
             <a:endParaRPr lang="hr-HR"/>
           </a:p>
@@ -8266,27 +8478,43 @@
             <p:ph idx="1"/>
           </p:nvPr>
         </p:nvSpPr>
-        <p:spPr/>
+        <p:spPr>
+          <a:xfrm>
+            <a:off x="715147" y="1940320"/>
+            <a:ext cx="7509510" cy="3867355"/>
+          </a:xfrm>
+        </p:spPr>
         <p:txBody>
           <a:bodyPr/>
           <a:lstStyle/>
           <a:p>
             <a:r>
               <a:rPr lang="hr-HR" dirty="0"/>
-              <a:t>Što je bilo dobro, a što je moglo bolje</a:t>
-            </a:r>
-          </a:p>
-          <a:p>
-            <a:pPr lvl="1"/>
-            <a:r>
-              <a:rPr lang="hr-HR" dirty="0"/>
-              <a:t>A što se nikako ne bi smjelo ponoviti </a:t>
-            </a:r>
+              <a:t>nikad ne ostavi posao za zadnji tren</a:t>
+            </a:r>
+          </a:p>
+          <a:p>
             <a:r>
               <a:rPr lang="hr-HR" dirty="0">
                 <a:sym typeface="Wingdings" panose="05000000000000000000" pitchFamily="2" charset="2"/>
               </a:rPr>
-              <a:t></a:t>
+              <a:t>važno je dobro organizirati i podijeliti posao u timu</a:t>
+            </a:r>
+          </a:p>
+          <a:p>
+            <a:r>
+              <a:rPr lang="hr-HR" dirty="0">
+                <a:sym typeface="Wingdings" panose="05000000000000000000" pitchFamily="2" charset="2"/>
+              </a:rPr>
+              <a:t>napravi raspored i točne ciljeve za određeni vremenski period</a:t>
+            </a:r>
+          </a:p>
+          <a:p>
+            <a:r>
+              <a:rPr lang="hr-HR" dirty="0">
+                <a:sym typeface="Wingdings" panose="05000000000000000000" pitchFamily="2" charset="2"/>
+              </a:rPr>
+              <a:t>dobar opis problema i specifilacija zahtjeva jako ubrzava posao</a:t>
             </a:r>
           </a:p>
           <a:p>
@@ -8368,10 +8596,18 @@
           <a:bodyPr/>
           <a:lstStyle/>
           <a:p>
-            <a:r>
-              <a:rPr lang="hr-HR" i="1" dirty="0"/>
-              <a:t>Nekoliko savjeta</a:t>
-            </a:r>
+            <a:pPr algn="ctr"/>
+            <a:r>
+              <a:rPr lang="hr-HR" dirty="0"/>
+              <a:t>Hvala na pažnji! </a:t>
+            </a:r>
+            <a:r>
+              <a:rPr lang="hr-HR" dirty="0">
+                <a:sym typeface="Wingdings" panose="05000000000000000000" pitchFamily="2" charset="2"/>
+              </a:rPr>
+              <a:t></a:t>
+            </a:r>
+            <a:endParaRPr lang="hr-HR" dirty="0"/>
           </a:p>
         </p:txBody>
       </p:sp>
@@ -8385,87 +8621,146 @@
             <p:ph idx="1"/>
           </p:nvPr>
         </p:nvSpPr>
-        <p:spPr/>
+        <p:spPr>
+          <a:xfrm>
+            <a:off x="1154429" y="1561546"/>
+            <a:ext cx="5840731" cy="4931327"/>
+          </a:xfrm>
+        </p:spPr>
         <p:txBody>
           <a:bodyPr>
-            <a:normAutofit fontScale="85000" lnSpcReduction="20000"/>
+            <a:normAutofit/>
           </a:bodyPr>
           <a:lstStyle/>
           <a:p>
-            <a:r>
-              <a:rPr lang="hr-HR" dirty="0"/>
-              <a:t>Zlatno pravilo dobre prezentacije: </a:t>
-            </a:r>
-          </a:p>
-          <a:p>
-            <a:pPr lvl="1"/>
-            <a:r>
-              <a:rPr lang="hr-HR" dirty="0"/>
-              <a:t>na svakom slajdu 6 natuknica s po 6 riječi</a:t>
-            </a:r>
-          </a:p>
-          <a:p>
-            <a:r>
-              <a:rPr lang="hr-HR" dirty="0"/>
-              <a:t>10ak slajdova je sasvim dovoljno – istaknite samo najvažnije činjenice</a:t>
-            </a:r>
-          </a:p>
-          <a:p>
-            <a:r>
-              <a:rPr lang="hr-HR" dirty="0"/>
-              <a:t>Dizajn možete mijenjati po volji, ali ne smije zasjeniti sadržaj (doslovno! - sve mora biti čitko i pregledno)</a:t>
-            </a:r>
-          </a:p>
-          <a:p>
-            <a:r>
-              <a:rPr lang="hr-HR" dirty="0"/>
-              <a:t>Na zadnjem slajdu stavite popis članova grupe s email adresama</a:t>
-            </a:r>
-          </a:p>
-          <a:p>
-            <a:endParaRPr lang="hr-HR" dirty="0"/>
-          </a:p>
-          <a:p>
-            <a:r>
-              <a:rPr lang="hr-HR" dirty="0"/>
-              <a:t>Kod izlaganja na satu:</a:t>
-            </a:r>
-          </a:p>
-          <a:p>
-            <a:pPr lvl="1"/>
-            <a:r>
-              <a:rPr lang="hr-HR" dirty="0"/>
-              <a:t>Pokrenite sve potrebne programe i alate na računalu prije početka Vašeg izlaganja te provjerite kompatibilnost opreme!</a:t>
-            </a:r>
-          </a:p>
-          <a:p>
-            <a:pPr lvl="1"/>
-            <a:r>
-              <a:rPr lang="hr-HR" dirty="0"/>
-              <a:t>Dobro uvježbajte prezentaciju.</a:t>
-            </a:r>
-          </a:p>
-          <a:p>
-            <a:pPr lvl="1"/>
-            <a:r>
-              <a:rPr lang="hr-HR" dirty="0"/>
-              <a:t>Izlaganje traje najviše 15 min i sastoji se od </a:t>
-            </a:r>
-            <a:r>
-              <a:rPr lang="hr-HR" dirty="0" err="1"/>
-              <a:t>ppt</a:t>
-            </a:r>
-            <a:r>
-              <a:rPr lang="hr-HR" dirty="0"/>
-              <a:t> prezentacije, demonstracije rada aplikacije i pitanja iz publike – </a:t>
-            </a:r>
-            <a:r>
-              <a:rPr lang="hr-HR" b="1" dirty="0"/>
-              <a:t>poštujte zadani vremenski okvir!</a:t>
-            </a:r>
-          </a:p>
-          <a:p>
-            <a:endParaRPr lang="hr-HR" dirty="0"/>
+            <a:pPr marL="457200" lvl="1" indent="0" algn="ctr">
+              <a:buNone/>
+            </a:pPr>
+            <a:r>
+              <a:rPr lang="hr-HR" sz="2400" dirty="0">
+                <a:sym typeface="Wingdings" panose="05000000000000000000" pitchFamily="2" charset="2"/>
+              </a:rPr>
+              <a:t>Izradili:</a:t>
+            </a:r>
+          </a:p>
+          <a:p>
+            <a:pPr marL="914400" lvl="2" indent="0" algn="ctr">
+              <a:buNone/>
+            </a:pPr>
+            <a:r>
+              <a:rPr lang="hr-HR" sz="2000" b="1" dirty="0">
+                <a:sym typeface="Wingdings" panose="05000000000000000000" pitchFamily="2" charset="2"/>
+              </a:rPr>
+              <a:t>Paula Močinić</a:t>
+            </a:r>
+            <a:r>
+              <a:rPr lang="hr-HR" sz="2000" dirty="0">
+                <a:sym typeface="Wingdings" panose="05000000000000000000" pitchFamily="2" charset="2"/>
+              </a:rPr>
+              <a:t> paula.mocinic@fer.hr</a:t>
+            </a:r>
+          </a:p>
+          <a:p>
+            <a:pPr marL="914400" lvl="2" indent="0" algn="ctr">
+              <a:buNone/>
+            </a:pPr>
+            <a:r>
+              <a:rPr lang="hr-HR" sz="2000" b="1" dirty="0">
+                <a:sym typeface="Wingdings" panose="05000000000000000000" pitchFamily="2" charset="2"/>
+              </a:rPr>
+              <a:t>Lucija Perković </a:t>
+            </a:r>
+            <a:r>
+              <a:rPr lang="hr-HR" sz="2000" dirty="0">
+                <a:sym typeface="Wingdings" panose="05000000000000000000" pitchFamily="2" charset="2"/>
+              </a:rPr>
+              <a:t>Lucija.Perkovic@fer.hr</a:t>
+            </a:r>
+          </a:p>
+          <a:p>
+            <a:pPr marL="914400" lvl="2" indent="0" algn="ctr">
+              <a:buNone/>
+            </a:pPr>
+            <a:r>
+              <a:rPr lang="hr-HR" sz="2000" b="1" dirty="0">
+                <a:sym typeface="Wingdings" panose="05000000000000000000" pitchFamily="2" charset="2"/>
+              </a:rPr>
+              <a:t>Mario Olčar</a:t>
+            </a:r>
+            <a:r>
+              <a:rPr lang="hr-HR" sz="2000" dirty="0">
+                <a:sym typeface="Wingdings" panose="05000000000000000000" pitchFamily="2" charset="2"/>
+              </a:rPr>
+              <a:t> mario.olcar@fer.hr</a:t>
+            </a:r>
+          </a:p>
+          <a:p>
+            <a:pPr marL="914400" lvl="2" indent="0" algn="ctr">
+              <a:buNone/>
+            </a:pPr>
+            <a:r>
+              <a:rPr lang="hr-HR" sz="2000" b="1" dirty="0">
+                <a:sym typeface="Wingdings" panose="05000000000000000000" pitchFamily="2" charset="2"/>
+              </a:rPr>
+              <a:t>Tomislav Marenić</a:t>
+            </a:r>
+            <a:r>
+              <a:rPr lang="hr-HR" sz="2000" dirty="0">
+                <a:sym typeface="Wingdings" panose="05000000000000000000" pitchFamily="2" charset="2"/>
+              </a:rPr>
+              <a:t> tomislav.marenic@fer.hr</a:t>
+            </a:r>
+          </a:p>
+          <a:p>
+            <a:pPr marL="914400" lvl="2" indent="0" algn="ctr">
+              <a:buNone/>
+            </a:pPr>
+            <a:r>
+              <a:rPr lang="hr-HR" sz="2000" b="1" dirty="0">
+                <a:sym typeface="Wingdings" panose="05000000000000000000" pitchFamily="2" charset="2"/>
+              </a:rPr>
+              <a:t>Ivan Bušljeta </a:t>
+            </a:r>
+            <a:r>
+              <a:rPr lang="hr-HR" sz="2000" dirty="0">
+                <a:sym typeface="Wingdings" panose="05000000000000000000" pitchFamily="2" charset="2"/>
+              </a:rPr>
+              <a:t>ivan.busljeta@fer.hr</a:t>
+            </a:r>
+          </a:p>
+          <a:p>
+            <a:pPr marL="914400" lvl="2" indent="0" algn="ctr">
+              <a:buNone/>
+            </a:pPr>
+            <a:r>
+              <a:rPr lang="hr-HR" sz="2000" b="1" dirty="0">
+                <a:sym typeface="Wingdings" panose="05000000000000000000" pitchFamily="2" charset="2"/>
+              </a:rPr>
+              <a:t>Lovro De-Villa</a:t>
+            </a:r>
+            <a:r>
+              <a:rPr lang="hr-HR" sz="2000" dirty="0">
+                <a:sym typeface="Wingdings" panose="05000000000000000000" pitchFamily="2" charset="2"/>
+              </a:rPr>
+              <a:t> lovro.de-villa@fer.hr</a:t>
+            </a:r>
+          </a:p>
+          <a:p>
+            <a:pPr marL="914400" lvl="2" indent="0" algn="ctr">
+              <a:buNone/>
+            </a:pPr>
+            <a:r>
+              <a:rPr lang="hr-HR" sz="2000" b="1" dirty="0">
+                <a:sym typeface="Wingdings" panose="05000000000000000000" pitchFamily="2" charset="2"/>
+              </a:rPr>
+              <a:t>Matija Huđin</a:t>
+            </a:r>
+            <a:r>
+              <a:rPr lang="hr-HR" sz="2000" dirty="0">
+                <a:sym typeface="Wingdings" panose="05000000000000000000" pitchFamily="2" charset="2"/>
+              </a:rPr>
+              <a:t> matija.hudin@fer.hr</a:t>
+            </a:r>
           </a:p>
         </p:txBody>
       </p:sp>
@@ -8495,7 +8790,7 @@
     </p:spTree>
     <p:extLst>
       <p:ext uri="{BB962C8B-B14F-4D97-AF65-F5344CB8AC3E}">
-        <p14:creationId xmlns:p14="http://schemas.microsoft.com/office/powerpoint/2010/main" val="3641737146"/>
+        <p14:creationId xmlns:p14="http://schemas.microsoft.com/office/powerpoint/2010/main" val="2121728561"/>
       </p:ext>
     </p:extLst>
   </p:cSld>
@@ -8561,37 +8856,37 @@
           <a:p>
             <a:r>
               <a:rPr lang="hr-HR" dirty="0"/>
-              <a:t>Opis zadatka</a:t>
+              <a:t>opis zadatka</a:t>
             </a:r>
           </a:p>
           <a:p>
             <a:r>
               <a:rPr lang="hr-HR" dirty="0"/>
-              <a:t>Pregled zahtjeva</a:t>
+              <a:t>pregled zahtjeva</a:t>
             </a:r>
           </a:p>
           <a:p>
             <a:r>
               <a:rPr lang="hr-HR" dirty="0"/>
-              <a:t>Korišteni alati i tehnologije</a:t>
+              <a:t>korišteni alati i tehnologije</a:t>
             </a:r>
           </a:p>
           <a:p>
             <a:r>
               <a:rPr lang="hr-HR" dirty="0"/>
-              <a:t>Arhitektura</a:t>
+              <a:t>arhitektura</a:t>
             </a:r>
           </a:p>
           <a:p>
             <a:r>
               <a:rPr lang="hr-HR" dirty="0"/>
-              <a:t>Organizacija rada </a:t>
+              <a:t>organizacija rada </a:t>
             </a:r>
           </a:p>
           <a:p>
             <a:r>
               <a:rPr lang="hr-HR" dirty="0"/>
-              <a:t>Iskustva</a:t>
+              <a:t>iskustva</a:t>
             </a:r>
           </a:p>
         </p:txBody>
@@ -8717,25 +9012,57 @@
           <a:p>
             <a:r>
               <a:rPr lang="hr-HR" dirty="0"/>
-              <a:t>osnovna ideja: aplikacija za rezervaciju, naplatu parkinga i pregled slobodnih mjesta za vozila i bicikle</a:t>
-            </a:r>
-          </a:p>
-          <a:p>
+              <a:t>osnovna ideja: aplikacija </a:t>
+            </a:r>
+            <a:r>
+              <a:rPr lang="hr-HR" b="1" dirty="0"/>
+              <a:t>za rezervaciju</a:t>
+            </a:r>
             <a:r>
               <a:rPr lang="hr-HR" dirty="0"/>
-              <a:t>cilj: olakšanje života vozačima</a:t>
-            </a:r>
-          </a:p>
-          <a:p>
+              <a:t>, </a:t>
+            </a:r>
+            <a:r>
+              <a:rPr lang="hr-HR" b="1" dirty="0"/>
+              <a:t>naplatu</a:t>
+            </a:r>
             <a:r>
               <a:rPr lang="hr-HR" dirty="0"/>
-              <a:t>svrha razvoja: povećati učinkovitost upravljanja parkiralištima</a:t>
-            </a:r>
-          </a:p>
-          <a:p>
+              <a:t> parkinga i </a:t>
+            </a:r>
+            <a:r>
+              <a:rPr lang="hr-HR" b="1" dirty="0"/>
+              <a:t>pregled</a:t>
+            </a:r>
             <a:r>
               <a:rPr lang="hr-HR" dirty="0"/>
-              <a:t>Slične aplikacije na tržištu:</a:t>
+              <a:t> slobodnih mjesta za vozila i bicikle</a:t>
+            </a:r>
+          </a:p>
+          <a:p>
+            <a:r>
+              <a:rPr lang="hr-HR" dirty="0"/>
+              <a:t>cilj: </a:t>
+            </a:r>
+            <a:r>
+              <a:rPr lang="hr-HR" b="1" dirty="0"/>
+              <a:t>olakšanje života vozačima</a:t>
+            </a:r>
+          </a:p>
+          <a:p>
+            <a:r>
+              <a:rPr lang="hr-HR" dirty="0"/>
+              <a:t>svrha razvoja: </a:t>
+            </a:r>
+            <a:r>
+              <a:rPr lang="hr-HR" b="1" dirty="0"/>
+              <a:t>povećati učinkovitost upravljanja parkiralištima</a:t>
+            </a:r>
+          </a:p>
+          <a:p>
+            <a:r>
+              <a:rPr lang="hr-HR" dirty="0"/>
+              <a:t>slične aplikacije na tržištu:</a:t>
             </a:r>
             <a:br>
               <a:rPr lang="hr-HR" dirty="0"/>
@@ -8797,51 +9124,7 @@
           <a:p>
             <a:r>
               <a:rPr lang="hr-HR" sz="3300" dirty="0"/>
-              <a:t>Lista glavnih funkcionalnih zahtjeva</a:t>
-            </a:r>
-          </a:p>
-        </p:txBody>
-      </p:sp>
-      <p:sp>
-        <p:nvSpPr>
-          <p:cNvPr id="3" name="Content Placeholder 2"/>
-          <p:cNvSpPr>
-            <a:spLocks noGrp="1"/>
-          </p:cNvSpPr>
-          <p:nvPr>
-            <p:ph idx="1"/>
-          </p:nvPr>
-        </p:nvSpPr>
-        <p:spPr/>
-        <p:txBody>
-          <a:bodyPr/>
-          <a:lstStyle/>
-          <a:p>
-            <a:r>
-              <a:rPr lang="hr-HR" dirty="0"/>
-              <a:t>Lista glavnih funkcionalnih zahtjeva (</a:t>
-            </a:r>
-            <a:r>
-              <a:rPr lang="hr-HR" dirty="0" err="1"/>
-              <a:t>max</a:t>
-            </a:r>
-            <a:r>
-              <a:rPr lang="hr-HR" dirty="0"/>
-              <a:t> 1 slajd)</a:t>
-            </a:r>
-          </a:p>
-          <a:p>
-            <a:r>
-              <a:rPr lang="hr-HR" dirty="0"/>
-              <a:t>Nefunkcionalni i zahtjevi domene primjene (</a:t>
-            </a:r>
-            <a:r>
-              <a:rPr lang="hr-HR" dirty="0" err="1"/>
-              <a:t>max</a:t>
-            </a:r>
-            <a:r>
-              <a:rPr lang="hr-HR" dirty="0"/>
-              <a:t> 1 slajd)</a:t>
+              <a:t>Funkcionalni zahtjevi</a:t>
             </a:r>
           </a:p>
         </p:txBody>
@@ -8869,10 +9152,516 @@
           </a:p>
         </p:txBody>
       </p:sp>
+      <p:sp>
+        <p:nvSpPr>
+          <p:cNvPr id="5" name="Rectangle 4">
+            <a:extLst>
+              <a:ext uri="{FF2B5EF4-FFF2-40B4-BE49-F238E27FC236}">
+                <a16:creationId xmlns:a16="http://schemas.microsoft.com/office/drawing/2014/main" id="{539C9EE5-548D-5EE2-FBBE-F22A6509750F}"/>
+              </a:ext>
+            </a:extLst>
+          </p:cNvPr>
+          <p:cNvSpPr/>
+          <p:nvPr/>
+        </p:nvSpPr>
+        <p:spPr>
+          <a:xfrm>
+            <a:off x="166043" y="2823519"/>
+            <a:ext cx="2619632" cy="1853513"/>
+          </a:xfrm>
+          <a:prstGeom prst="rect">
+            <a:avLst/>
+          </a:prstGeom>
+          <a:solidFill>
+            <a:schemeClr val="bg1"/>
+          </a:solidFill>
+          <a:ln w="76200"/>
+        </p:spPr>
+        <p:style>
+          <a:lnRef idx="2">
+            <a:schemeClr val="accent1">
+              <a:shade val="15000"/>
+            </a:schemeClr>
+          </a:lnRef>
+          <a:fillRef idx="1">
+            <a:schemeClr val="accent1"/>
+          </a:fillRef>
+          <a:effectRef idx="0">
+            <a:schemeClr val="accent1"/>
+          </a:effectRef>
+          <a:fontRef idx="minor">
+            <a:schemeClr val="lt1"/>
+          </a:fontRef>
+        </p:style>
+        <p:txBody>
+          <a:bodyPr rtlCol="0" anchor="ctr"/>
+          <a:lstStyle/>
+          <a:p>
+            <a:pPr algn="ctr"/>
+            <a:r>
+              <a:rPr lang="hr-HR" sz="2400" b="1" dirty="0">
+                <a:solidFill>
+                  <a:sysClr val="windowText" lastClr="000000"/>
+                </a:solidFill>
+              </a:rPr>
+              <a:t>dionici</a:t>
+            </a:r>
+            <a:endParaRPr lang="hr-HR" dirty="0">
+              <a:solidFill>
+                <a:sysClr val="windowText" lastClr="000000"/>
+              </a:solidFill>
+            </a:endParaRPr>
+          </a:p>
+          <a:p>
+            <a:pPr algn="ctr"/>
+            <a:r>
+              <a:rPr lang="hr-HR" dirty="0">
+                <a:solidFill>
+                  <a:sysClr val="windowText" lastClr="000000"/>
+                </a:solidFill>
+              </a:rPr>
+              <a:t>Voditelj parkirališta</a:t>
+            </a:r>
+          </a:p>
+          <a:p>
+            <a:pPr algn="ctr"/>
+            <a:r>
+              <a:rPr lang="hr-HR" dirty="0">
+                <a:solidFill>
+                  <a:sysClr val="windowText" lastClr="000000"/>
+                </a:solidFill>
+              </a:rPr>
+              <a:t>Klijenti</a:t>
+            </a:r>
+          </a:p>
+          <a:p>
+            <a:pPr algn="ctr"/>
+            <a:r>
+              <a:rPr lang="hr-HR" dirty="0">
+                <a:solidFill>
+                  <a:sysClr val="windowText" lastClr="000000"/>
+                </a:solidFill>
+              </a:rPr>
+              <a:t>Administrator</a:t>
+            </a:r>
+          </a:p>
+        </p:txBody>
+      </p:sp>
+      <p:sp>
+        <p:nvSpPr>
+          <p:cNvPr id="6" name="Rectangle 5">
+            <a:extLst>
+              <a:ext uri="{FF2B5EF4-FFF2-40B4-BE49-F238E27FC236}">
+                <a16:creationId xmlns:a16="http://schemas.microsoft.com/office/drawing/2014/main" id="{1B20F392-FC74-AD82-1B38-4081481A6EFA}"/>
+              </a:ext>
+            </a:extLst>
+          </p:cNvPr>
+          <p:cNvSpPr/>
+          <p:nvPr/>
+        </p:nvSpPr>
+        <p:spPr>
+          <a:xfrm>
+            <a:off x="3018523" y="1353064"/>
+            <a:ext cx="2755557" cy="1853513"/>
+          </a:xfrm>
+          <a:prstGeom prst="rect">
+            <a:avLst/>
+          </a:prstGeom>
+          <a:solidFill>
+            <a:schemeClr val="bg1"/>
+          </a:solidFill>
+          <a:ln w="38100"/>
+        </p:spPr>
+        <p:style>
+          <a:lnRef idx="2">
+            <a:schemeClr val="accent1">
+              <a:shade val="15000"/>
+            </a:schemeClr>
+          </a:lnRef>
+          <a:fillRef idx="1">
+            <a:schemeClr val="accent1"/>
+          </a:fillRef>
+          <a:effectRef idx="0">
+            <a:schemeClr val="accent1"/>
+          </a:effectRef>
+          <a:fontRef idx="minor">
+            <a:schemeClr val="lt1"/>
+          </a:fontRef>
+        </p:style>
+        <p:txBody>
+          <a:bodyPr rtlCol="0" anchor="ctr"/>
+          <a:lstStyle/>
+          <a:p>
+            <a:pPr algn="ctr">
+              <a:spcBef>
+                <a:spcPts val="300"/>
+              </a:spcBef>
+              <a:spcAft>
+                <a:spcPts val="300"/>
+              </a:spcAft>
+            </a:pPr>
+            <a:r>
+              <a:rPr lang="hr-HR" sz="2400" b="1" dirty="0">
+                <a:solidFill>
+                  <a:sysClr val="windowText" lastClr="000000"/>
+                </a:solidFill>
+              </a:rPr>
+              <a:t>voditelj parkirališta</a:t>
+            </a:r>
+            <a:endParaRPr lang="hr-HR" b="1" dirty="0">
+              <a:solidFill>
+                <a:sysClr val="windowText" lastClr="000000"/>
+              </a:solidFill>
+            </a:endParaRPr>
+          </a:p>
+          <a:p>
+            <a:pPr algn="ctr">
+              <a:spcBef>
+                <a:spcPts val="300"/>
+              </a:spcBef>
+              <a:spcAft>
+                <a:spcPts val="300"/>
+              </a:spcAft>
+            </a:pPr>
+            <a:r>
+              <a:rPr lang="hr-HR" b="1" dirty="0">
+                <a:solidFill>
+                  <a:sysClr val="windowText" lastClr="000000"/>
+                </a:solidFill>
+              </a:rPr>
+              <a:t>unijeti informacije</a:t>
+            </a:r>
+          </a:p>
+          <a:p>
+            <a:pPr algn="ctr">
+              <a:spcBef>
+                <a:spcPts val="300"/>
+              </a:spcBef>
+              <a:spcAft>
+                <a:spcPts val="300"/>
+              </a:spcAft>
+            </a:pPr>
+            <a:r>
+              <a:rPr lang="hr-HR" dirty="0">
+                <a:solidFill>
+                  <a:sysClr val="windowText" lastClr="000000"/>
+                </a:solidFill>
+              </a:rPr>
+              <a:t> </a:t>
+            </a:r>
+            <a:r>
+              <a:rPr lang="hr-HR" b="1" dirty="0">
+                <a:solidFill>
+                  <a:sysClr val="windowText" lastClr="000000"/>
+                </a:solidFill>
+              </a:rPr>
+              <a:t>ucrtati parkirno mjesto</a:t>
+            </a:r>
+          </a:p>
+          <a:p>
+            <a:pPr algn="ctr">
+              <a:spcBef>
+                <a:spcPts val="300"/>
+              </a:spcBef>
+              <a:spcAft>
+                <a:spcPts val="300"/>
+              </a:spcAft>
+            </a:pPr>
+            <a:r>
+              <a:rPr lang="hr-HR" b="1" dirty="0">
+                <a:solidFill>
+                  <a:sysClr val="windowText" lastClr="000000"/>
+                </a:solidFill>
+              </a:rPr>
+              <a:t>vidjeti informacije o zauzetosti</a:t>
+            </a:r>
+          </a:p>
+        </p:txBody>
+      </p:sp>
+      <p:sp>
+        <p:nvSpPr>
+          <p:cNvPr id="11" name="Rectangle 10">
+            <a:extLst>
+              <a:ext uri="{FF2B5EF4-FFF2-40B4-BE49-F238E27FC236}">
+                <a16:creationId xmlns:a16="http://schemas.microsoft.com/office/drawing/2014/main" id="{61289E88-E589-1152-5FD6-FE528E612314}"/>
+              </a:ext>
+            </a:extLst>
+          </p:cNvPr>
+          <p:cNvSpPr/>
+          <p:nvPr/>
+        </p:nvSpPr>
+        <p:spPr>
+          <a:xfrm>
+            <a:off x="6006928" y="1353064"/>
+            <a:ext cx="2755557" cy="1853513"/>
+          </a:xfrm>
+          <a:prstGeom prst="rect">
+            <a:avLst/>
+          </a:prstGeom>
+          <a:solidFill>
+            <a:schemeClr val="bg1"/>
+          </a:solidFill>
+          <a:ln w="38100"/>
+        </p:spPr>
+        <p:style>
+          <a:lnRef idx="2">
+            <a:schemeClr val="accent1">
+              <a:shade val="15000"/>
+            </a:schemeClr>
+          </a:lnRef>
+          <a:fillRef idx="1">
+            <a:schemeClr val="accent1"/>
+          </a:fillRef>
+          <a:effectRef idx="0">
+            <a:schemeClr val="accent1"/>
+          </a:effectRef>
+          <a:fontRef idx="minor">
+            <a:schemeClr val="lt1"/>
+          </a:fontRef>
+        </p:style>
+        <p:txBody>
+          <a:bodyPr rtlCol="0" anchor="ctr"/>
+          <a:lstStyle/>
+          <a:p>
+            <a:pPr algn="ctr">
+              <a:spcBef>
+                <a:spcPts val="300"/>
+              </a:spcBef>
+              <a:spcAft>
+                <a:spcPts val="300"/>
+              </a:spcAft>
+            </a:pPr>
+            <a:r>
+              <a:rPr lang="hr-HR" sz="2400" b="1" dirty="0">
+                <a:solidFill>
+                  <a:sysClr val="windowText" lastClr="000000"/>
+                </a:solidFill>
+              </a:rPr>
+              <a:t>klijenti</a:t>
+            </a:r>
+            <a:endParaRPr lang="hr-HR" b="1" dirty="0">
+              <a:solidFill>
+                <a:sysClr val="windowText" lastClr="000000"/>
+              </a:solidFill>
+            </a:endParaRPr>
+          </a:p>
+          <a:p>
+            <a:pPr algn="ctr">
+              <a:spcBef>
+                <a:spcPts val="300"/>
+              </a:spcBef>
+              <a:spcAft>
+                <a:spcPts val="300"/>
+              </a:spcAft>
+            </a:pPr>
+            <a:r>
+              <a:rPr lang="hr-HR" b="1" dirty="0">
+                <a:solidFill>
+                  <a:sysClr val="windowText" lastClr="000000"/>
+                </a:solidFill>
+              </a:rPr>
+              <a:t>informacije o zauzetosti</a:t>
+            </a:r>
+          </a:p>
+          <a:p>
+            <a:pPr algn="ctr">
+              <a:spcBef>
+                <a:spcPts val="300"/>
+              </a:spcBef>
+              <a:spcAft>
+                <a:spcPts val="300"/>
+              </a:spcAft>
+            </a:pPr>
+            <a:r>
+              <a:rPr lang="hr-HR" dirty="0">
+                <a:solidFill>
+                  <a:sysClr val="windowText" lastClr="000000"/>
+                </a:solidFill>
+              </a:rPr>
+              <a:t> </a:t>
+            </a:r>
+            <a:r>
+              <a:rPr lang="hr-HR" b="1" dirty="0">
+                <a:solidFill>
+                  <a:sysClr val="windowText" lastClr="000000"/>
+                </a:solidFill>
+              </a:rPr>
+              <a:t>nadopuniti svoj novčanik</a:t>
+            </a:r>
+          </a:p>
+          <a:p>
+            <a:pPr algn="ctr">
+              <a:spcBef>
+                <a:spcPts val="300"/>
+              </a:spcBef>
+              <a:spcAft>
+                <a:spcPts val="300"/>
+              </a:spcAft>
+            </a:pPr>
+            <a:r>
+              <a:rPr lang="hr-HR" b="1" dirty="0">
+                <a:solidFill>
+                  <a:sysClr val="windowText" lastClr="000000"/>
+                </a:solidFill>
+              </a:rPr>
+              <a:t>odabrati odredište, tip vozila i trajanje parkinga</a:t>
+            </a:r>
+          </a:p>
+        </p:txBody>
+      </p:sp>
+      <p:sp>
+        <p:nvSpPr>
+          <p:cNvPr id="12" name="Rectangle 11">
+            <a:extLst>
+              <a:ext uri="{FF2B5EF4-FFF2-40B4-BE49-F238E27FC236}">
+                <a16:creationId xmlns:a16="http://schemas.microsoft.com/office/drawing/2014/main" id="{4FFC8AA1-276D-34CE-21EE-36C3E196A413}"/>
+              </a:ext>
+            </a:extLst>
+          </p:cNvPr>
+          <p:cNvSpPr/>
+          <p:nvPr/>
+        </p:nvSpPr>
+        <p:spPr>
+          <a:xfrm>
+            <a:off x="4536474" y="3429000"/>
+            <a:ext cx="2755557" cy="2872947"/>
+          </a:xfrm>
+          <a:prstGeom prst="rect">
+            <a:avLst/>
+          </a:prstGeom>
+          <a:solidFill>
+            <a:schemeClr val="bg1"/>
+          </a:solidFill>
+          <a:ln w="38100"/>
+        </p:spPr>
+        <p:style>
+          <a:lnRef idx="2">
+            <a:schemeClr val="accent1">
+              <a:shade val="15000"/>
+            </a:schemeClr>
+          </a:lnRef>
+          <a:fillRef idx="1">
+            <a:schemeClr val="accent1"/>
+          </a:fillRef>
+          <a:effectRef idx="0">
+            <a:schemeClr val="accent1"/>
+          </a:effectRef>
+          <a:fontRef idx="minor">
+            <a:schemeClr val="lt1"/>
+          </a:fontRef>
+        </p:style>
+        <p:txBody>
+          <a:bodyPr rtlCol="0" anchor="ctr"/>
+          <a:lstStyle/>
+          <a:p>
+            <a:pPr algn="ctr">
+              <a:spcBef>
+                <a:spcPts val="300"/>
+              </a:spcBef>
+              <a:spcAft>
+                <a:spcPts val="300"/>
+              </a:spcAft>
+            </a:pPr>
+            <a:r>
+              <a:rPr lang="hr-HR" sz="2400" b="1" dirty="0">
+                <a:solidFill>
+                  <a:sysClr val="windowText" lastClr="000000"/>
+                </a:solidFill>
+              </a:rPr>
+              <a:t>administrator</a:t>
+            </a:r>
+            <a:endParaRPr lang="hr-HR" b="1" dirty="0">
+              <a:solidFill>
+                <a:sysClr val="windowText" lastClr="000000"/>
+              </a:solidFill>
+            </a:endParaRPr>
+          </a:p>
+          <a:p>
+            <a:pPr algn="ctr">
+              <a:spcBef>
+                <a:spcPts val="300"/>
+              </a:spcBef>
+              <a:spcAft>
+                <a:spcPts val="300"/>
+              </a:spcAft>
+            </a:pPr>
+            <a:r>
+              <a:rPr lang="hr-HR" b="1" dirty="0">
+                <a:solidFill>
+                  <a:sysClr val="windowText" lastClr="000000"/>
+                </a:solidFill>
+              </a:rPr>
+              <a:t>vidjeti popis korisnika</a:t>
+            </a:r>
+          </a:p>
+          <a:p>
+            <a:pPr algn="ctr">
+              <a:spcBef>
+                <a:spcPts val="300"/>
+              </a:spcBef>
+              <a:spcAft>
+                <a:spcPts val="300"/>
+              </a:spcAft>
+            </a:pPr>
+            <a:r>
+              <a:rPr lang="hr-HR" dirty="0">
+                <a:solidFill>
+                  <a:sysClr val="windowText" lastClr="000000"/>
+                </a:solidFill>
+              </a:rPr>
+              <a:t> </a:t>
+            </a:r>
+            <a:r>
+              <a:rPr lang="hr-HR" b="1" dirty="0">
+                <a:solidFill>
+                  <a:sysClr val="windowText" lastClr="000000"/>
+                </a:solidFill>
+              </a:rPr>
+              <a:t>mjenjanje razine pristupa korisnika</a:t>
+            </a:r>
+          </a:p>
+          <a:p>
+            <a:pPr algn="ctr">
+              <a:spcBef>
+                <a:spcPts val="300"/>
+              </a:spcBef>
+              <a:spcAft>
+                <a:spcPts val="300"/>
+              </a:spcAft>
+            </a:pPr>
+            <a:r>
+              <a:rPr lang="hr-HR" b="1" dirty="0">
+                <a:solidFill>
+                  <a:sysClr val="windowText" lastClr="000000"/>
+                </a:solidFill>
+              </a:rPr>
+              <a:t>dodavanje, brisanje parkirališta</a:t>
+            </a:r>
+          </a:p>
+          <a:p>
+            <a:pPr algn="ctr">
+              <a:spcBef>
+                <a:spcPts val="300"/>
+              </a:spcBef>
+              <a:spcAft>
+                <a:spcPts val="300"/>
+              </a:spcAft>
+            </a:pPr>
+            <a:r>
+              <a:rPr lang="hr-HR" b="1" dirty="0">
+                <a:solidFill>
+                  <a:sysClr val="windowText" lastClr="000000"/>
+                </a:solidFill>
+              </a:rPr>
+              <a:t>potvrda voditelja parkirališta</a:t>
+            </a:r>
+          </a:p>
+        </p:txBody>
+      </p:sp>
     </p:spTree>
     <p:extLst>
       <p:ext uri="{BB962C8B-B14F-4D97-AF65-F5344CB8AC3E}">
-        <p14:creationId xmlns:p14="http://schemas.microsoft.com/office/powerpoint/2010/main" val="3161375826"/>
+        <p14:creationId xmlns:p14="http://schemas.microsoft.com/office/powerpoint/2010/main" val="3127128847"/>
       </p:ext>
     </p:extLst>
   </p:cSld>
@@ -8946,11 +9735,38 @@
             <p:ph idx="1"/>
           </p:nvPr>
         </p:nvSpPr>
-        <p:spPr/>
+        <p:spPr>
+          <a:xfrm>
+            <a:off x="628650" y="2001795"/>
+            <a:ext cx="7886700" cy="4325086"/>
+          </a:xfrm>
+        </p:spPr>
         <p:txBody>
           <a:bodyPr/>
           <a:lstStyle/>
           <a:p>
+            <a:r>
+              <a:rPr lang="hr-HR" dirty="0"/>
+              <a:t>omogučiti rad više korisnika istovremeno</a:t>
+            </a:r>
+          </a:p>
+          <a:p>
+            <a:r>
+              <a:rPr lang="hr-HR" dirty="0"/>
+              <a:t>pristup bazi podataka ne smije trajati duže od nekoliko sekundi</a:t>
+            </a:r>
+          </a:p>
+          <a:p>
+            <a:r>
+              <a:rPr lang="hr-HR" dirty="0"/>
+              <a:t>sustav treba biti implementiran kao aplikacija koristeći objektno-orijentirane jezike</a:t>
+            </a:r>
+          </a:p>
+          <a:p>
+            <a:r>
+              <a:rPr lang="hr-HR" dirty="0"/>
+              <a:t>veza s bazom mora biti kvalitetno zaštićena, brza i otporna na vanjske greške</a:t>
+            </a:r>
             <a:endParaRPr lang="en-US" dirty="0"/>
           </a:p>
         </p:txBody>
@@ -9046,62 +9862,116 @@
             <p:ph idx="1"/>
           </p:nvPr>
         </p:nvSpPr>
-        <p:spPr/>
+        <p:spPr>
+          <a:xfrm>
+            <a:off x="628650" y="1797528"/>
+            <a:ext cx="7886700" cy="3262943"/>
+          </a:xfrm>
+        </p:spPr>
         <p:txBody>
           <a:bodyPr/>
           <a:lstStyle/>
           <a:p>
             <a:r>
               <a:rPr lang="hr-HR" dirty="0"/>
-              <a:t>Popis svih korištenih alata (za izradu programske podrške, dokumentacije, komunikaciju i upravljanje)</a:t>
-            </a:r>
-          </a:p>
-          <a:p>
-            <a:pPr lvl="1"/>
+              <a:t>za komunikaciju: </a:t>
+            </a:r>
+            <a:r>
+              <a:rPr lang="hr-HR" b="1" dirty="0"/>
+              <a:t>WhatsApp</a:t>
+            </a:r>
             <a:r>
               <a:rPr lang="hr-HR" dirty="0"/>
-              <a:t>Poželjno staviti linkove za web stranice pojedinih</a:t>
-            </a:r>
-          </a:p>
-          <a:p>
-            <a:pPr marL="457200" lvl="1" indent="0">
-              <a:buNone/>
-            </a:pPr>
-            <a:endParaRPr lang="hr-HR" dirty="0"/>
+              <a:t> i </a:t>
+            </a:r>
+            <a:r>
+              <a:rPr lang="hr-HR" b="1" dirty="0"/>
+              <a:t>Microsoft Teams</a:t>
+            </a:r>
           </a:p>
           <a:p>
             <a:r>
               <a:rPr lang="hr-HR" dirty="0"/>
-              <a:t>Korišteni programski jezici i tehnologije</a:t>
-            </a:r>
-          </a:p>
-          <a:p>
-            <a:pPr lvl="1"/>
+              <a:t>za razvoj: </a:t>
+            </a:r>
+            <a:r>
+              <a:rPr lang="hr-HR" b="1" dirty="0"/>
+              <a:t>Microsoft Visual Studio 2022 </a:t>
+            </a:r>
             <a:r>
               <a:rPr lang="hr-HR" dirty="0"/>
-              <a:t>Naznačiti što je korišteno za front </a:t>
-            </a:r>
-            <a:r>
-              <a:rPr lang="hr-HR" dirty="0" err="1"/>
-              <a:t>end</a:t>
+              <a:t>za razvoj backend-a i </a:t>
+            </a:r>
+            <a:r>
+              <a:rPr lang="hr-HR" b="1" dirty="0"/>
+              <a:t>Microsoft Visual Studio Code </a:t>
             </a:r>
             <a:r>
               <a:rPr lang="hr-HR" dirty="0"/>
-              <a:t> a što za </a:t>
-            </a:r>
-            <a:r>
-              <a:rPr lang="hr-HR" dirty="0" err="1"/>
-              <a:t>back</a:t>
+              <a:t>za frontend, </a:t>
+            </a:r>
+            <a:r>
+              <a:rPr lang="hr-HR" b="1" dirty="0"/>
+              <a:t>Astah UML</a:t>
             </a:r>
             <a:r>
               <a:rPr lang="hr-HR" dirty="0"/>
-              <a:t> </a:t>
-            </a:r>
-            <a:r>
-              <a:rPr lang="hr-HR" dirty="0" err="1"/>
-              <a:t>end</a:t>
-            </a:r>
-            <a:endParaRPr lang="hr-HR" dirty="0"/>
+              <a:t> za dijagrame</a:t>
+            </a:r>
+          </a:p>
+          <a:p>
+            <a:r>
+              <a:rPr lang="hr-HR" dirty="0"/>
+              <a:t>korištene tehnologije: </a:t>
+            </a:r>
+            <a:r>
+              <a:rPr lang="hr-HR" b="1" dirty="0"/>
+              <a:t>C#</a:t>
+            </a:r>
+            <a:r>
+              <a:rPr lang="hr-HR" dirty="0"/>
+              <a:t> i </a:t>
+            </a:r>
+            <a:r>
+              <a:rPr lang="hr-HR" b="1" dirty="0"/>
+              <a:t>.NET</a:t>
+            </a:r>
+            <a:r>
+              <a:rPr lang="hr-HR" dirty="0"/>
+              <a:t> framework za backend i </a:t>
+            </a:r>
+            <a:r>
+              <a:rPr lang="hr-HR" b="1" dirty="0"/>
+              <a:t>HTML</a:t>
+            </a:r>
+            <a:r>
+              <a:rPr lang="hr-HR" dirty="0"/>
+              <a:t>, </a:t>
+            </a:r>
+            <a:r>
+              <a:rPr lang="hr-HR" b="1" dirty="0"/>
+              <a:t>CSS</a:t>
+            </a:r>
+            <a:r>
+              <a:rPr lang="hr-HR" dirty="0"/>
+              <a:t>, </a:t>
+            </a:r>
+            <a:r>
+              <a:rPr lang="hr-HR" b="1" dirty="0"/>
+              <a:t>JavaScript</a:t>
+            </a:r>
+            <a:r>
+              <a:rPr lang="hr-HR" dirty="0"/>
+              <a:t> i </a:t>
+            </a:r>
+            <a:r>
+              <a:rPr lang="hr-HR" b="1" dirty="0"/>
+              <a:t>React.js</a:t>
+            </a:r>
+            <a:r>
+              <a:rPr lang="hr-HR" dirty="0"/>
+              <a:t> </a:t>
+            </a:r>
           </a:p>
         </p:txBody>
       </p:sp>
@@ -9131,7 +10001,7 @@
     </p:spTree>
     <p:extLst>
       <p:ext uri="{BB962C8B-B14F-4D97-AF65-F5344CB8AC3E}">
-        <p14:creationId xmlns:p14="http://schemas.microsoft.com/office/powerpoint/2010/main" val="3389772446"/>
+        <p14:creationId xmlns:p14="http://schemas.microsoft.com/office/powerpoint/2010/main" val="1158760424"/>
       </p:ext>
     </p:extLst>
   </p:cSld>
@@ -9175,39 +10045,8 @@
           <a:p>
             <a:r>
               <a:rPr lang="hr-HR" dirty="0"/>
-              <a:t>Korišteni alati i tehnologije</a:t>
-            </a:r>
-          </a:p>
-        </p:txBody>
-      </p:sp>
-      <p:sp>
-        <p:nvSpPr>
-          <p:cNvPr id="3" name="Content Placeholder 2"/>
-          <p:cNvSpPr>
-            <a:spLocks noGrp="1"/>
-          </p:cNvSpPr>
-          <p:nvPr>
-            <p:ph idx="1"/>
-          </p:nvPr>
-        </p:nvSpPr>
-        <p:spPr/>
-        <p:txBody>
-          <a:bodyPr/>
-          <a:lstStyle/>
-          <a:p>
-            <a:r>
-              <a:rPr lang="hr-HR" dirty="0"/>
-              <a:t>Za komunikaciju: WhatsApp i Microsoft Teams</a:t>
-            </a:r>
-          </a:p>
-          <a:p>
-            <a:r>
-              <a:rPr lang="hr-HR" dirty="0"/>
-              <a:t>Za razvoj: Microsoft Visual Studio 2022 za razvoj backend-a i Microsoft Visual Studio Code za frontend</a:t>
-            </a:r>
-          </a:p>
-          <a:p>
-            <a:endParaRPr lang="hr-HR" dirty="0"/>
+              <a:t>Arhitektura sustava</a:t>
+            </a:r>
           </a:p>
         </p:txBody>
       </p:sp>
@@ -9234,10 +10073,759 @@
           </a:p>
         </p:txBody>
       </p:sp>
+      <p:pic>
+        <p:nvPicPr>
+          <p:cNvPr id="1026" name="Picture 2" descr="Desktop Computer Icon Vector Isolated Stock Illustration - Download Image  Now - Clip Art, Computer, Computer Keyboard - iStock">
+            <a:extLst>
+              <a:ext uri="{FF2B5EF4-FFF2-40B4-BE49-F238E27FC236}">
+                <a16:creationId xmlns:a16="http://schemas.microsoft.com/office/drawing/2014/main" id="{C0C2B7BA-776A-E81A-479F-DC69D2E190CD}"/>
+              </a:ext>
+            </a:extLst>
+          </p:cNvPr>
+          <p:cNvPicPr>
+            <a:picLocks noChangeAspect="1" noChangeArrowheads="1"/>
+          </p:cNvPicPr>
+          <p:nvPr/>
+        </p:nvPicPr>
+        <p:blipFill>
+          <a:blip r:embed="rId3" cstate="print">
+            <a:extLst>
+              <a:ext uri="{28A0092B-C50C-407E-A947-70E740481C1C}">
+                <a14:useLocalDpi xmlns:a14="http://schemas.microsoft.com/office/drawing/2010/main" val="0"/>
+              </a:ext>
+            </a:extLst>
+          </a:blip>
+          <a:srcRect/>
+          <a:stretch>
+            <a:fillRect/>
+          </a:stretch>
+        </p:blipFill>
+        <p:spPr bwMode="auto">
+          <a:xfrm>
+            <a:off x="0" y="2763286"/>
+            <a:ext cx="2008094" cy="2008094"/>
+          </a:xfrm>
+          <a:prstGeom prst="rect">
+            <a:avLst/>
+          </a:prstGeom>
+          <a:noFill/>
+          <a:extLst>
+            <a:ext uri="{909E8E84-426E-40DD-AFC4-6F175D3DCCD1}">
+              <a14:hiddenFill xmlns:a14="http://schemas.microsoft.com/office/drawing/2010/main">
+                <a:solidFill>
+                  <a:srgbClr val="FFFFFF"/>
+                </a:solidFill>
+              </a14:hiddenFill>
+            </a:ext>
+          </a:extLst>
+        </p:spPr>
+      </p:pic>
+      <p:grpSp>
+        <p:nvGrpSpPr>
+          <p:cNvPr id="27" name="Group 26">
+            <a:extLst>
+              <a:ext uri="{FF2B5EF4-FFF2-40B4-BE49-F238E27FC236}">
+                <a16:creationId xmlns:a16="http://schemas.microsoft.com/office/drawing/2014/main" id="{82344472-C822-2082-BAE0-1719BD581FE6}"/>
+              </a:ext>
+            </a:extLst>
+          </p:cNvPr>
+          <p:cNvGrpSpPr/>
+          <p:nvPr/>
+        </p:nvGrpSpPr>
+        <p:grpSpPr>
+          <a:xfrm>
+            <a:off x="99035" y="2324742"/>
+            <a:ext cx="8930665" cy="3424530"/>
+            <a:chOff x="99035" y="2324742"/>
+            <a:chExt cx="8930665" cy="3424530"/>
+          </a:xfrm>
+        </p:grpSpPr>
+        <p:sp>
+          <p:nvSpPr>
+            <p:cNvPr id="6" name="Rectangle 5">
+              <a:extLst>
+                <a:ext uri="{FF2B5EF4-FFF2-40B4-BE49-F238E27FC236}">
+                  <a16:creationId xmlns:a16="http://schemas.microsoft.com/office/drawing/2014/main" id="{6F4EC859-E18D-5B5F-F569-FAC9B0E68B2B}"/>
+                </a:ext>
+              </a:extLst>
+            </p:cNvPr>
+            <p:cNvSpPr/>
+            <p:nvPr/>
+          </p:nvSpPr>
+          <p:spPr>
+            <a:xfrm>
+              <a:off x="4404597" y="2324742"/>
+              <a:ext cx="926757" cy="2446638"/>
+            </a:xfrm>
+            <a:prstGeom prst="rect">
+              <a:avLst/>
+            </a:prstGeom>
+            <a:solidFill>
+              <a:schemeClr val="bg1"/>
+            </a:solidFill>
+            <a:ln w="57150">
+              <a:solidFill>
+                <a:schemeClr val="tx1"/>
+              </a:solidFill>
+            </a:ln>
+          </p:spPr>
+          <p:style>
+            <a:lnRef idx="2">
+              <a:schemeClr val="accent1">
+                <a:shade val="15000"/>
+              </a:schemeClr>
+            </a:lnRef>
+            <a:fillRef idx="1">
+              <a:schemeClr val="accent1"/>
+            </a:fillRef>
+            <a:effectRef idx="0">
+              <a:schemeClr val="accent1"/>
+            </a:effectRef>
+            <a:fontRef idx="minor">
+              <a:schemeClr val="lt1"/>
+            </a:fontRef>
+          </p:style>
+          <p:txBody>
+            <a:bodyPr rtlCol="0" anchor="ctr"/>
+            <a:lstStyle/>
+            <a:p>
+              <a:pPr algn="ctr"/>
+              <a:endParaRPr lang="en-US"/>
+            </a:p>
+          </p:txBody>
+        </p:sp>
+        <p:pic>
+          <p:nvPicPr>
+            <p:cNvPr id="1028" name="Picture 4" descr="Web Server Icons - Free SVG &amp; PNG Web Server Images - Noun Project">
+              <a:extLst>
+                <a:ext uri="{FF2B5EF4-FFF2-40B4-BE49-F238E27FC236}">
+                  <a16:creationId xmlns:a16="http://schemas.microsoft.com/office/drawing/2014/main" id="{D43FDB5E-3066-2465-EDBC-F2550C0EE6B2}"/>
+                </a:ext>
+              </a:extLst>
+            </p:cNvPr>
+            <p:cNvPicPr>
+              <a:picLocks noChangeAspect="1" noChangeArrowheads="1"/>
+            </p:cNvPicPr>
+            <p:nvPr/>
+          </p:nvPicPr>
+          <p:blipFill>
+            <a:blip r:embed="rId4">
+              <a:extLst>
+                <a:ext uri="{28A0092B-C50C-407E-A947-70E740481C1C}">
+                  <a14:useLocalDpi xmlns:a14="http://schemas.microsoft.com/office/drawing/2010/main" val="0"/>
+                </a:ext>
+              </a:extLst>
+            </a:blip>
+            <a:srcRect/>
+            <a:stretch>
+              <a:fillRect/>
+            </a:stretch>
+          </p:blipFill>
+          <p:spPr bwMode="auto">
+            <a:xfrm>
+              <a:off x="5708720" y="2742504"/>
+              <a:ext cx="1905000" cy="1905000"/>
+            </a:xfrm>
+            <a:prstGeom prst="rect">
+              <a:avLst/>
+            </a:prstGeom>
+            <a:noFill/>
+            <a:extLst>
+              <a:ext uri="{909E8E84-426E-40DD-AFC4-6F175D3DCCD1}">
+                <a14:hiddenFill xmlns:a14="http://schemas.microsoft.com/office/drawing/2010/main">
+                  <a:solidFill>
+                    <a:srgbClr val="FFFFFF"/>
+                  </a:solidFill>
+                </a14:hiddenFill>
+              </a:ext>
+            </a:extLst>
+          </p:spPr>
+        </p:pic>
+        <p:pic>
+          <p:nvPicPr>
+            <p:cNvPr id="1030" name="Picture 6" descr="Databases Services Online | Fiverr">
+              <a:extLst>
+                <a:ext uri="{FF2B5EF4-FFF2-40B4-BE49-F238E27FC236}">
+                  <a16:creationId xmlns:a16="http://schemas.microsoft.com/office/drawing/2014/main" id="{3FEA26AD-D867-7323-24F7-EDF5CAD92D47}"/>
+                </a:ext>
+              </a:extLst>
+            </p:cNvPr>
+            <p:cNvPicPr>
+              <a:picLocks noChangeAspect="1" noChangeArrowheads="1"/>
+            </p:cNvPicPr>
+            <p:nvPr/>
+          </p:nvPicPr>
+          <p:blipFill>
+            <a:blip r:embed="rId5">
+              <a:extLst>
+                <a:ext uri="{28A0092B-C50C-407E-A947-70E740481C1C}">
+                  <a14:useLocalDpi xmlns:a14="http://schemas.microsoft.com/office/drawing/2010/main" val="0"/>
+                </a:ext>
+              </a:extLst>
+            </a:blip>
+            <a:srcRect/>
+            <a:stretch>
+              <a:fillRect/>
+            </a:stretch>
+          </p:blipFill>
+          <p:spPr bwMode="auto">
+            <a:xfrm>
+              <a:off x="7613720" y="4078734"/>
+              <a:ext cx="1296269" cy="1296269"/>
+            </a:xfrm>
+            <a:prstGeom prst="rect">
+              <a:avLst/>
+            </a:prstGeom>
+            <a:noFill/>
+            <a:extLst>
+              <a:ext uri="{909E8E84-426E-40DD-AFC4-6F175D3DCCD1}">
+                <a14:hiddenFill xmlns:a14="http://schemas.microsoft.com/office/drawing/2010/main">
+                  <a:solidFill>
+                    <a:srgbClr val="FFFFFF"/>
+                  </a:solidFill>
+                </a14:hiddenFill>
+              </a:ext>
+            </a:extLst>
+          </p:spPr>
+        </p:pic>
+        <p:cxnSp>
+          <p:nvCxnSpPr>
+            <p:cNvPr id="8" name="Straight Arrow Connector 7">
+              <a:extLst>
+                <a:ext uri="{FF2B5EF4-FFF2-40B4-BE49-F238E27FC236}">
+                  <a16:creationId xmlns:a16="http://schemas.microsoft.com/office/drawing/2014/main" id="{D58677B4-7BF6-5401-416F-55F2B6104C2F}"/>
+                </a:ext>
+              </a:extLst>
+            </p:cNvPr>
+            <p:cNvCxnSpPr/>
+            <p:nvPr/>
+          </p:nvCxnSpPr>
+          <p:spPr>
+            <a:xfrm>
+              <a:off x="1588770" y="3429000"/>
+              <a:ext cx="2815827" cy="0"/>
+            </a:xfrm>
+            <a:prstGeom prst="straightConnector1">
+              <a:avLst/>
+            </a:prstGeom>
+            <a:ln w="57150">
+              <a:solidFill>
+                <a:schemeClr val="tx1"/>
+              </a:solidFill>
+              <a:tailEnd type="triangle"/>
+            </a:ln>
+          </p:spPr>
+          <p:style>
+            <a:lnRef idx="1">
+              <a:schemeClr val="accent1"/>
+            </a:lnRef>
+            <a:fillRef idx="0">
+              <a:schemeClr val="accent1"/>
+            </a:fillRef>
+            <a:effectRef idx="0">
+              <a:schemeClr val="accent1"/>
+            </a:effectRef>
+            <a:fontRef idx="minor">
+              <a:schemeClr val="tx1"/>
+            </a:fontRef>
+          </p:style>
+        </p:cxnSp>
+        <p:cxnSp>
+          <p:nvCxnSpPr>
+            <p:cNvPr id="9" name="Straight Arrow Connector 8">
+              <a:extLst>
+                <a:ext uri="{FF2B5EF4-FFF2-40B4-BE49-F238E27FC236}">
+                  <a16:creationId xmlns:a16="http://schemas.microsoft.com/office/drawing/2014/main" id="{DF94C7A6-1266-6771-BE2E-14FDFB2DDB5C}"/>
+                </a:ext>
+              </a:extLst>
+            </p:cNvPr>
+            <p:cNvCxnSpPr/>
+            <p:nvPr/>
+          </p:nvCxnSpPr>
+          <p:spPr>
+            <a:xfrm>
+              <a:off x="1588770" y="3874770"/>
+              <a:ext cx="2815827" cy="0"/>
+            </a:xfrm>
+            <a:prstGeom prst="straightConnector1">
+              <a:avLst/>
+            </a:prstGeom>
+            <a:ln w="57150">
+              <a:solidFill>
+                <a:schemeClr val="tx1"/>
+              </a:solidFill>
+              <a:headEnd type="triangle" w="med" len="med"/>
+              <a:tailEnd type="none" w="med" len="med"/>
+            </a:ln>
+          </p:spPr>
+          <p:style>
+            <a:lnRef idx="1">
+              <a:schemeClr val="accent1"/>
+            </a:lnRef>
+            <a:fillRef idx="0">
+              <a:schemeClr val="accent1"/>
+            </a:fillRef>
+            <a:effectRef idx="0">
+              <a:schemeClr val="accent1"/>
+            </a:effectRef>
+            <a:fontRef idx="minor">
+              <a:schemeClr val="tx1"/>
+            </a:fontRef>
+          </p:style>
+        </p:cxnSp>
+        <p:cxnSp>
+          <p:nvCxnSpPr>
+            <p:cNvPr id="10" name="Straight Arrow Connector 9">
+              <a:extLst>
+                <a:ext uri="{FF2B5EF4-FFF2-40B4-BE49-F238E27FC236}">
+                  <a16:creationId xmlns:a16="http://schemas.microsoft.com/office/drawing/2014/main" id="{734B9320-E25F-DCCA-6C51-0ED5F6F45A69}"/>
+                </a:ext>
+              </a:extLst>
+            </p:cNvPr>
+            <p:cNvCxnSpPr>
+              <a:cxnSpLocks/>
+            </p:cNvCxnSpPr>
+            <p:nvPr/>
+          </p:nvCxnSpPr>
+          <p:spPr>
+            <a:xfrm>
+              <a:off x="6495366" y="4880528"/>
+              <a:ext cx="1023455" cy="0"/>
+            </a:xfrm>
+            <a:prstGeom prst="straightConnector1">
+              <a:avLst/>
+            </a:prstGeom>
+            <a:ln w="57150">
+              <a:solidFill>
+                <a:schemeClr val="tx1"/>
+              </a:solidFill>
+              <a:headEnd type="none" w="med" len="med"/>
+              <a:tailEnd type="none" w="med" len="med"/>
+            </a:ln>
+          </p:spPr>
+          <p:style>
+            <a:lnRef idx="1">
+              <a:schemeClr val="accent1"/>
+            </a:lnRef>
+            <a:fillRef idx="0">
+              <a:schemeClr val="accent1"/>
+            </a:fillRef>
+            <a:effectRef idx="0">
+              <a:schemeClr val="accent1"/>
+            </a:effectRef>
+            <a:fontRef idx="minor">
+              <a:schemeClr val="tx1"/>
+            </a:fontRef>
+          </p:style>
+        </p:cxnSp>
+        <p:cxnSp>
+          <p:nvCxnSpPr>
+            <p:cNvPr id="11" name="Straight Arrow Connector 10">
+              <a:extLst>
+                <a:ext uri="{FF2B5EF4-FFF2-40B4-BE49-F238E27FC236}">
+                  <a16:creationId xmlns:a16="http://schemas.microsoft.com/office/drawing/2014/main" id="{AE12B6F9-AF7E-5915-C7A3-C78EBB4AB81D}"/>
+                </a:ext>
+              </a:extLst>
+            </p:cNvPr>
+            <p:cNvCxnSpPr>
+              <a:cxnSpLocks/>
+            </p:cNvCxnSpPr>
+            <p:nvPr/>
+          </p:nvCxnSpPr>
+          <p:spPr>
+            <a:xfrm flipV="1">
+              <a:off x="6518226" y="4377690"/>
+              <a:ext cx="0" cy="502838"/>
+            </a:xfrm>
+            <a:prstGeom prst="straightConnector1">
+              <a:avLst/>
+            </a:prstGeom>
+            <a:ln w="57150">
+              <a:solidFill>
+                <a:schemeClr val="tx1"/>
+              </a:solidFill>
+              <a:headEnd type="none" w="med" len="med"/>
+              <a:tailEnd type="none" w="med" len="med"/>
+            </a:ln>
+          </p:spPr>
+          <p:style>
+            <a:lnRef idx="1">
+              <a:schemeClr val="accent1"/>
+            </a:lnRef>
+            <a:fillRef idx="0">
+              <a:schemeClr val="accent1"/>
+            </a:fillRef>
+            <a:effectRef idx="0">
+              <a:schemeClr val="accent1"/>
+            </a:effectRef>
+            <a:fontRef idx="minor">
+              <a:schemeClr val="tx1"/>
+            </a:fontRef>
+          </p:style>
+        </p:cxnSp>
+        <p:sp>
+          <p:nvSpPr>
+            <p:cNvPr id="17" name="TextBox 16">
+              <a:extLst>
+                <a:ext uri="{FF2B5EF4-FFF2-40B4-BE49-F238E27FC236}">
+                  <a16:creationId xmlns:a16="http://schemas.microsoft.com/office/drawing/2014/main" id="{E357DFD7-FD6F-F47A-F975-FD94FE9ED76C}"/>
+                </a:ext>
+              </a:extLst>
+            </p:cNvPr>
+            <p:cNvSpPr txBox="1"/>
+            <p:nvPr/>
+          </p:nvSpPr>
+          <p:spPr>
+            <a:xfrm>
+              <a:off x="4307905" y="3398001"/>
+              <a:ext cx="1120140" cy="369332"/>
+            </a:xfrm>
+            <a:prstGeom prst="rect">
+              <a:avLst/>
+            </a:prstGeom>
+            <a:noFill/>
+          </p:spPr>
+          <p:txBody>
+            <a:bodyPr wrap="square" rtlCol="0">
+              <a:spAutoFit/>
+            </a:bodyPr>
+            <a:lstStyle/>
+            <a:p>
+              <a:pPr algn="ctr"/>
+              <a:r>
+                <a:rPr lang="hr-HR" b="1" dirty="0"/>
+                <a:t>API</a:t>
+              </a:r>
+              <a:endParaRPr lang="en-US" b="1" dirty="0"/>
+            </a:p>
+          </p:txBody>
+        </p:sp>
+        <p:sp>
+          <p:nvSpPr>
+            <p:cNvPr id="18" name="TextBox 17">
+              <a:extLst>
+                <a:ext uri="{FF2B5EF4-FFF2-40B4-BE49-F238E27FC236}">
+                  <a16:creationId xmlns:a16="http://schemas.microsoft.com/office/drawing/2014/main" id="{244CA8EE-684A-99B7-D4E1-276DB9D4AB03}"/>
+                </a:ext>
+              </a:extLst>
+            </p:cNvPr>
+            <p:cNvSpPr txBox="1"/>
+            <p:nvPr/>
+          </p:nvSpPr>
+          <p:spPr>
+            <a:xfrm>
+              <a:off x="5708720" y="2594600"/>
+              <a:ext cx="1904999" cy="369332"/>
+            </a:xfrm>
+            <a:prstGeom prst="rect">
+              <a:avLst/>
+            </a:prstGeom>
+            <a:noFill/>
+          </p:spPr>
+          <p:txBody>
+            <a:bodyPr wrap="square" rtlCol="0">
+              <a:spAutoFit/>
+            </a:bodyPr>
+            <a:lstStyle/>
+            <a:p>
+              <a:pPr algn="ctr"/>
+              <a:r>
+                <a:rPr lang="hr-HR" b="1" dirty="0"/>
+                <a:t>Web server</a:t>
+              </a:r>
+              <a:endParaRPr lang="en-US" b="1" dirty="0"/>
+            </a:p>
+          </p:txBody>
+        </p:sp>
+        <p:sp>
+          <p:nvSpPr>
+            <p:cNvPr id="19" name="TextBox 18">
+              <a:extLst>
+                <a:ext uri="{FF2B5EF4-FFF2-40B4-BE49-F238E27FC236}">
+                  <a16:creationId xmlns:a16="http://schemas.microsoft.com/office/drawing/2014/main" id="{7A0E4A76-D1F0-EDAC-4160-75AE2D9AE6A7}"/>
+                </a:ext>
+              </a:extLst>
+            </p:cNvPr>
+            <p:cNvSpPr txBox="1"/>
+            <p:nvPr/>
+          </p:nvSpPr>
+          <p:spPr>
+            <a:xfrm>
+              <a:off x="7163145" y="5379940"/>
+              <a:ext cx="1866555" cy="369332"/>
+            </a:xfrm>
+            <a:prstGeom prst="rect">
+              <a:avLst/>
+            </a:prstGeom>
+            <a:noFill/>
+          </p:spPr>
+          <p:txBody>
+            <a:bodyPr wrap="square" rtlCol="0">
+              <a:spAutoFit/>
+            </a:bodyPr>
+            <a:lstStyle/>
+            <a:p>
+              <a:pPr algn="ctr"/>
+              <a:r>
+                <a:rPr lang="hr-HR" b="1" dirty="0"/>
+                <a:t>Baza podataka</a:t>
+              </a:r>
+              <a:endParaRPr lang="en-US" b="1" dirty="0"/>
+            </a:p>
+          </p:txBody>
+        </p:sp>
+        <p:sp>
+          <p:nvSpPr>
+            <p:cNvPr id="5" name="Cloud 4">
+              <a:extLst>
+                <a:ext uri="{FF2B5EF4-FFF2-40B4-BE49-F238E27FC236}">
+                  <a16:creationId xmlns:a16="http://schemas.microsoft.com/office/drawing/2014/main" id="{3D4F1099-D2AB-D156-4B96-DFDD864FAAA0}"/>
+                </a:ext>
+              </a:extLst>
+            </p:cNvPr>
+            <p:cNvSpPr/>
+            <p:nvPr/>
+          </p:nvSpPr>
+          <p:spPr>
+            <a:xfrm>
+              <a:off x="2008094" y="3114570"/>
+              <a:ext cx="1809175" cy="1160867"/>
+            </a:xfrm>
+            <a:prstGeom prst="cloud">
+              <a:avLst/>
+            </a:prstGeom>
+            <a:solidFill>
+              <a:schemeClr val="bg1"/>
+            </a:solidFill>
+            <a:ln w="38100">
+              <a:solidFill>
+                <a:schemeClr val="tx1"/>
+              </a:solidFill>
+            </a:ln>
+          </p:spPr>
+          <p:style>
+            <a:lnRef idx="2">
+              <a:schemeClr val="accent1">
+                <a:shade val="15000"/>
+              </a:schemeClr>
+            </a:lnRef>
+            <a:fillRef idx="1">
+              <a:schemeClr val="accent1"/>
+            </a:fillRef>
+            <a:effectRef idx="0">
+              <a:schemeClr val="accent1"/>
+            </a:effectRef>
+            <a:fontRef idx="minor">
+              <a:schemeClr val="lt1"/>
+            </a:fontRef>
+          </p:style>
+          <p:txBody>
+            <a:bodyPr rtlCol="0" anchor="ctr"/>
+            <a:lstStyle/>
+            <a:p>
+              <a:pPr algn="ctr"/>
+              <a:endParaRPr lang="en-US"/>
+            </a:p>
+          </p:txBody>
+        </p:sp>
+        <p:sp>
+          <p:nvSpPr>
+            <p:cNvPr id="20" name="TextBox 19">
+              <a:extLst>
+                <a:ext uri="{FF2B5EF4-FFF2-40B4-BE49-F238E27FC236}">
+                  <a16:creationId xmlns:a16="http://schemas.microsoft.com/office/drawing/2014/main" id="{BF9F4B29-67C6-1DB6-0D68-18D954939C23}"/>
+                </a:ext>
+              </a:extLst>
+            </p:cNvPr>
+            <p:cNvSpPr txBox="1"/>
+            <p:nvPr/>
+          </p:nvSpPr>
+          <p:spPr>
+            <a:xfrm>
+              <a:off x="2008094" y="3451473"/>
+              <a:ext cx="1866555" cy="369332"/>
+            </a:xfrm>
+            <a:prstGeom prst="rect">
+              <a:avLst/>
+            </a:prstGeom>
+            <a:noFill/>
+          </p:spPr>
+          <p:txBody>
+            <a:bodyPr wrap="square" rtlCol="0">
+              <a:spAutoFit/>
+            </a:bodyPr>
+            <a:lstStyle/>
+            <a:p>
+              <a:pPr algn="ctr"/>
+              <a:r>
+                <a:rPr lang="hr-HR" b="1" dirty="0"/>
+                <a:t>Internet</a:t>
+              </a:r>
+              <a:endParaRPr lang="en-US" b="1" dirty="0"/>
+            </a:p>
+          </p:txBody>
+        </p:sp>
+        <p:sp>
+          <p:nvSpPr>
+            <p:cNvPr id="21" name="TextBox 20">
+              <a:extLst>
+                <a:ext uri="{FF2B5EF4-FFF2-40B4-BE49-F238E27FC236}">
+                  <a16:creationId xmlns:a16="http://schemas.microsoft.com/office/drawing/2014/main" id="{E2A17299-0043-1942-B4CF-7A16F208A4C4}"/>
+                </a:ext>
+              </a:extLst>
+            </p:cNvPr>
+            <p:cNvSpPr txBox="1"/>
+            <p:nvPr/>
+          </p:nvSpPr>
+          <p:spPr>
+            <a:xfrm>
+              <a:off x="99035" y="2594600"/>
+              <a:ext cx="1866555" cy="646331"/>
+            </a:xfrm>
+            <a:prstGeom prst="rect">
+              <a:avLst/>
+            </a:prstGeom>
+            <a:noFill/>
+          </p:spPr>
+          <p:txBody>
+            <a:bodyPr wrap="square" rtlCol="0">
+              <a:spAutoFit/>
+            </a:bodyPr>
+            <a:lstStyle/>
+            <a:p>
+              <a:pPr algn="ctr"/>
+              <a:r>
+                <a:rPr lang="hr-HR" b="1" dirty="0"/>
+                <a:t>aplikacija u web pregledniku</a:t>
+              </a:r>
+              <a:endParaRPr lang="en-US" b="1" dirty="0"/>
+            </a:p>
+          </p:txBody>
+        </p:sp>
+        <p:cxnSp>
+          <p:nvCxnSpPr>
+            <p:cNvPr id="22" name="Straight Arrow Connector 21">
+              <a:extLst>
+                <a:ext uri="{FF2B5EF4-FFF2-40B4-BE49-F238E27FC236}">
+                  <a16:creationId xmlns:a16="http://schemas.microsoft.com/office/drawing/2014/main" id="{FE535BA4-4823-3EEA-F9E2-499678F25430}"/>
+                </a:ext>
+              </a:extLst>
+            </p:cNvPr>
+            <p:cNvCxnSpPr>
+              <a:cxnSpLocks/>
+            </p:cNvCxnSpPr>
+            <p:nvPr/>
+          </p:nvCxnSpPr>
+          <p:spPr>
+            <a:xfrm>
+              <a:off x="5331354" y="3624627"/>
+              <a:ext cx="692256" cy="0"/>
+            </a:xfrm>
+            <a:prstGeom prst="straightConnector1">
+              <a:avLst/>
+            </a:prstGeom>
+            <a:ln w="57150">
+              <a:solidFill>
+                <a:schemeClr val="tx1"/>
+              </a:solidFill>
+              <a:headEnd type="none" w="med" len="med"/>
+              <a:tailEnd type="none" w="med" len="med"/>
+            </a:ln>
+          </p:spPr>
+          <p:style>
+            <a:lnRef idx="1">
+              <a:schemeClr val="accent1"/>
+            </a:lnRef>
+            <a:fillRef idx="0">
+              <a:schemeClr val="accent1"/>
+            </a:fillRef>
+            <a:effectRef idx="0">
+              <a:schemeClr val="accent1"/>
+            </a:effectRef>
+            <a:fontRef idx="minor">
+              <a:schemeClr val="tx1"/>
+            </a:fontRef>
+          </p:style>
+        </p:cxnSp>
+        <p:sp>
+          <p:nvSpPr>
+            <p:cNvPr id="25" name="TextBox 24">
+              <a:extLst>
+                <a:ext uri="{FF2B5EF4-FFF2-40B4-BE49-F238E27FC236}">
+                  <a16:creationId xmlns:a16="http://schemas.microsoft.com/office/drawing/2014/main" id="{F144B285-C979-E747-538B-A67AA86C81AA}"/>
+                </a:ext>
+              </a:extLst>
+            </p:cNvPr>
+            <p:cNvSpPr txBox="1"/>
+            <p:nvPr/>
+          </p:nvSpPr>
+          <p:spPr>
+            <a:xfrm>
+              <a:off x="978125" y="3120509"/>
+              <a:ext cx="1866555" cy="276999"/>
+            </a:xfrm>
+            <a:prstGeom prst="rect">
+              <a:avLst/>
+            </a:prstGeom>
+            <a:noFill/>
+          </p:spPr>
+          <p:txBody>
+            <a:bodyPr wrap="square" rtlCol="0">
+              <a:spAutoFit/>
+            </a:bodyPr>
+            <a:lstStyle/>
+            <a:p>
+              <a:pPr algn="ctr"/>
+              <a:r>
+                <a:rPr lang="hr-HR" sz="1200" b="1" dirty="0"/>
+                <a:t>request</a:t>
+              </a:r>
+              <a:endParaRPr lang="en-US" sz="1200" b="1" dirty="0"/>
+            </a:p>
+          </p:txBody>
+        </p:sp>
+        <p:sp>
+          <p:nvSpPr>
+            <p:cNvPr id="26" name="TextBox 25">
+              <a:extLst>
+                <a:ext uri="{FF2B5EF4-FFF2-40B4-BE49-F238E27FC236}">
+                  <a16:creationId xmlns:a16="http://schemas.microsoft.com/office/drawing/2014/main" id="{A4BA0B13-A1B6-AA04-D16B-4807970A993A}"/>
+                </a:ext>
+              </a:extLst>
+            </p:cNvPr>
+            <p:cNvSpPr txBox="1"/>
+            <p:nvPr/>
+          </p:nvSpPr>
+          <p:spPr>
+            <a:xfrm>
+              <a:off x="3103587" y="3886921"/>
+              <a:ext cx="1866555" cy="276999"/>
+            </a:xfrm>
+            <a:prstGeom prst="rect">
+              <a:avLst/>
+            </a:prstGeom>
+            <a:noFill/>
+          </p:spPr>
+          <p:txBody>
+            <a:bodyPr wrap="square" rtlCol="0">
+              <a:spAutoFit/>
+            </a:bodyPr>
+            <a:lstStyle/>
+            <a:p>
+              <a:pPr algn="ctr"/>
+              <a:r>
+                <a:rPr lang="hr-HR" sz="1200" b="1" dirty="0"/>
+                <a:t>response</a:t>
+              </a:r>
+              <a:endParaRPr lang="en-US" sz="1200" b="1" dirty="0"/>
+            </a:p>
+          </p:txBody>
+        </p:sp>
+      </p:grpSp>
     </p:spTree>
     <p:extLst>
       <p:ext uri="{BB962C8B-B14F-4D97-AF65-F5344CB8AC3E}">
-        <p14:creationId xmlns:p14="http://schemas.microsoft.com/office/powerpoint/2010/main" val="1158760424"/>
+        <p14:creationId xmlns:p14="http://schemas.microsoft.com/office/powerpoint/2010/main" val="3657354464"/>
       </p:ext>
     </p:extLst>
   </p:cSld>
@@ -9281,35 +10869,7 @@
           <a:p>
             <a:r>
               <a:rPr lang="hr-HR" dirty="0"/>
-              <a:t>Arhitektura sustava</a:t>
-            </a:r>
-          </a:p>
-        </p:txBody>
-      </p:sp>
-      <p:sp>
-        <p:nvSpPr>
-          <p:cNvPr id="3" name="Content Placeholder 2"/>
-          <p:cNvSpPr>
-            <a:spLocks noGrp="1"/>
-          </p:cNvSpPr>
-          <p:nvPr>
-            <p:ph idx="1"/>
-          </p:nvPr>
-        </p:nvSpPr>
-        <p:spPr/>
-        <p:txBody>
-          <a:bodyPr/>
-          <a:lstStyle/>
-          <a:p>
-            <a:r>
-              <a:rPr lang="hr-HR" dirty="0"/>
-              <a:t>Na visokoj razini apstrakcije</a:t>
-            </a:r>
-          </a:p>
-          <a:p>
-            <a:r>
-              <a:rPr lang="hr-HR" dirty="0"/>
-              <a:t>Obavezno staviti dijagram </a:t>
+              <a:t>Vremenska linija razvoja</a:t>
             </a:r>
           </a:p>
         </p:txBody>
@@ -9337,10 +10897,40 @@
           </a:p>
         </p:txBody>
       </p:sp>
+      <p:pic>
+        <p:nvPicPr>
+          <p:cNvPr id="6" name="Picture 5">
+            <a:extLst>
+              <a:ext uri="{FF2B5EF4-FFF2-40B4-BE49-F238E27FC236}">
+                <a16:creationId xmlns:a16="http://schemas.microsoft.com/office/drawing/2014/main" id="{B1A80709-9240-AC6A-38ED-E578B8E52628}"/>
+              </a:ext>
+            </a:extLst>
+          </p:cNvPr>
+          <p:cNvPicPr>
+            <a:picLocks noChangeAspect="1"/>
+          </p:cNvPicPr>
+          <p:nvPr/>
+        </p:nvPicPr>
+        <p:blipFill>
+          <a:blip r:embed="rId2"/>
+          <a:stretch>
+            <a:fillRect/>
+          </a:stretch>
+        </p:blipFill>
+        <p:spPr>
+          <a:xfrm>
+            <a:off x="537208" y="1630563"/>
+            <a:ext cx="7801471" cy="4441711"/>
+          </a:xfrm>
+          <a:prstGeom prst="rect">
+            <a:avLst/>
+          </a:prstGeom>
+        </p:spPr>
+      </p:pic>
     </p:spTree>
     <p:extLst>
       <p:ext uri="{BB962C8B-B14F-4D97-AF65-F5344CB8AC3E}">
-        <p14:creationId xmlns:p14="http://schemas.microsoft.com/office/powerpoint/2010/main" val="3657354464"/>
+        <p14:creationId xmlns:p14="http://schemas.microsoft.com/office/powerpoint/2010/main" val="4285223946"/>
       </p:ext>
     </p:extLst>
   </p:cSld>
@@ -9384,56 +10974,7 @@
           <a:p>
             <a:r>
               <a:rPr lang="hr-HR" dirty="0"/>
-              <a:t>Organizacija rada</a:t>
-            </a:r>
-          </a:p>
-        </p:txBody>
-      </p:sp>
-      <p:sp>
-        <p:nvSpPr>
-          <p:cNvPr id="3" name="Content Placeholder 2"/>
-          <p:cNvSpPr>
-            <a:spLocks noGrp="1"/>
-          </p:cNvSpPr>
-          <p:nvPr>
-            <p:ph idx="1"/>
-          </p:nvPr>
-        </p:nvSpPr>
-        <p:spPr/>
-        <p:txBody>
-          <a:bodyPr/>
-          <a:lstStyle/>
-          <a:p>
-            <a:r>
-              <a:rPr lang="hr-HR" dirty="0"/>
-              <a:t>Vremenska linija razvoja (specifikacija, implementacija, ispitivanje, dokumentiranje)</a:t>
-            </a:r>
-          </a:p>
-          <a:p>
-            <a:pPr lvl="1"/>
-            <a:r>
-              <a:rPr lang="hr-HR" dirty="0"/>
-              <a:t>Poželjan grafički prikaz</a:t>
-            </a:r>
-          </a:p>
-          <a:p>
-            <a:pPr marL="457200" lvl="1" indent="0">
-              <a:buNone/>
-            </a:pPr>
-            <a:endParaRPr lang="hr-HR" dirty="0"/>
-          </a:p>
-          <a:p>
-            <a:r>
-              <a:rPr lang="hr-HR" dirty="0"/>
-              <a:t>Raspodjela posla po članovima tima (koliko </a:t>
-            </a:r>
-            <a:r>
-              <a:rPr lang="hr-HR" dirty="0" err="1"/>
-              <a:t>developera</a:t>
-            </a:r>
-            <a:r>
-              <a:rPr lang="hr-HR" dirty="0"/>
-              <a:t>, koliko testera…)</a:t>
+              <a:t>Organizacija tima</a:t>
             </a:r>
           </a:p>
         </p:txBody>
@@ -9461,10 +11002,159 @@
           </a:p>
         </p:txBody>
       </p:sp>
+      <p:sp>
+        <p:nvSpPr>
+          <p:cNvPr id="3" name="Content Placeholder 2">
+            <a:extLst>
+              <a:ext uri="{FF2B5EF4-FFF2-40B4-BE49-F238E27FC236}">
+                <a16:creationId xmlns:a16="http://schemas.microsoft.com/office/drawing/2014/main" id="{0148E61C-CB43-19EA-AB6D-91C6A6A59F68}"/>
+              </a:ext>
+            </a:extLst>
+          </p:cNvPr>
+          <p:cNvSpPr>
+            <a:spLocks noGrp="1"/>
+          </p:cNvSpPr>
+          <p:nvPr>
+            <p:ph idx="1"/>
+          </p:nvPr>
+        </p:nvSpPr>
+        <p:spPr>
+          <a:xfrm>
+            <a:off x="2108834" y="1780898"/>
+            <a:ext cx="4926331" cy="3296204"/>
+          </a:xfrm>
+        </p:spPr>
+        <p:txBody>
+          <a:bodyPr>
+            <a:normAutofit/>
+          </a:bodyPr>
+          <a:lstStyle/>
+          <a:p>
+            <a:pPr marL="457200" lvl="1" indent="0">
+              <a:buNone/>
+            </a:pPr>
+            <a:r>
+              <a:rPr lang="hr-HR" sz="2400" b="1" dirty="0">
+                <a:sym typeface="Wingdings" panose="05000000000000000000" pitchFamily="2" charset="2"/>
+              </a:rPr>
+              <a:t>voditelj</a:t>
+            </a:r>
+            <a:r>
+              <a:rPr lang="hr-HR" sz="2400" dirty="0">
+                <a:sym typeface="Wingdings" panose="05000000000000000000" pitchFamily="2" charset="2"/>
+              </a:rPr>
+              <a:t>: Mario Olčar</a:t>
+            </a:r>
+          </a:p>
+          <a:p>
+            <a:pPr marL="457200" lvl="1" indent="0">
+              <a:buNone/>
+            </a:pPr>
+            <a:r>
+              <a:rPr lang="hr-HR" sz="2400" b="1" dirty="0">
+                <a:sym typeface="Wingdings" panose="05000000000000000000" pitchFamily="2" charset="2"/>
+              </a:rPr>
+              <a:t>dokumentacija</a:t>
+            </a:r>
+            <a:r>
+              <a:rPr lang="hr-HR" sz="2400" dirty="0">
+                <a:sym typeface="Wingdings" panose="05000000000000000000" pitchFamily="2" charset="2"/>
+              </a:rPr>
+              <a:t>: Paula Močinić</a:t>
+            </a:r>
+          </a:p>
+          <a:p>
+            <a:pPr marL="457200" lvl="1" indent="0">
+              <a:buNone/>
+            </a:pPr>
+            <a:r>
+              <a:rPr lang="hr-HR" sz="2400" b="1" dirty="0">
+                <a:sym typeface="Wingdings" panose="05000000000000000000" pitchFamily="2" charset="2"/>
+              </a:rPr>
+              <a:t>frontend</a:t>
+            </a:r>
+            <a:r>
+              <a:rPr lang="hr-HR" sz="2400" dirty="0">
+                <a:sym typeface="Wingdings" panose="05000000000000000000" pitchFamily="2" charset="2"/>
+              </a:rPr>
+              <a:t>:  Lucija Perković</a:t>
+            </a:r>
+          </a:p>
+          <a:p>
+            <a:pPr marL="457200" lvl="1" indent="0">
+              <a:buNone/>
+            </a:pPr>
+            <a:r>
+              <a:rPr lang="hr-HR" sz="2400" dirty="0">
+                <a:sym typeface="Wingdings" panose="05000000000000000000" pitchFamily="2" charset="2"/>
+              </a:rPr>
+              <a:t>		Paula Močinić</a:t>
+            </a:r>
+          </a:p>
+          <a:p>
+            <a:pPr marL="457200" lvl="1" indent="0">
+              <a:buNone/>
+            </a:pPr>
+            <a:r>
+              <a:rPr lang="hr-HR" sz="2400" dirty="0">
+                <a:sym typeface="Wingdings" panose="05000000000000000000" pitchFamily="2" charset="2"/>
+              </a:rPr>
+              <a:t>		Tomislav Marenić</a:t>
+            </a:r>
+          </a:p>
+          <a:p>
+            <a:pPr marL="457200" lvl="1" indent="0">
+              <a:buNone/>
+            </a:pPr>
+            <a:r>
+              <a:rPr lang="hr-HR" sz="2400" b="1" dirty="0">
+                <a:sym typeface="Wingdings" panose="05000000000000000000" pitchFamily="2" charset="2"/>
+              </a:rPr>
+              <a:t>backend</a:t>
+            </a:r>
+            <a:r>
+              <a:rPr lang="hr-HR" sz="2400" dirty="0">
+                <a:sym typeface="Wingdings" panose="05000000000000000000" pitchFamily="2" charset="2"/>
+              </a:rPr>
+              <a:t>:  Matija Huđin</a:t>
+            </a:r>
+          </a:p>
+          <a:p>
+            <a:pPr marL="457200" lvl="1" indent="0">
+              <a:buNone/>
+            </a:pPr>
+            <a:r>
+              <a:rPr lang="hr-HR" sz="2400" dirty="0">
+                <a:sym typeface="Wingdings" panose="05000000000000000000" pitchFamily="2" charset="2"/>
+              </a:rPr>
+              <a:t>		Ivan Bušljeta</a:t>
+            </a:r>
+          </a:p>
+          <a:p>
+            <a:pPr marL="457200" lvl="1" indent="0">
+              <a:buNone/>
+            </a:pPr>
+            <a:r>
+              <a:rPr lang="hr-HR" sz="2400" dirty="0">
+                <a:sym typeface="Wingdings" panose="05000000000000000000" pitchFamily="2" charset="2"/>
+              </a:rPr>
+              <a:t>		Lovro De-Villa</a:t>
+            </a:r>
+          </a:p>
+          <a:p>
+            <a:pPr marL="457200" lvl="1" indent="0" algn="ctr">
+              <a:buNone/>
+            </a:pPr>
+            <a:endParaRPr lang="hr-HR" sz="2000" dirty="0">
+              <a:sym typeface="Wingdings" panose="05000000000000000000" pitchFamily="2" charset="2"/>
+            </a:endParaRPr>
+          </a:p>
+        </p:txBody>
+      </p:sp>
     </p:spTree>
     <p:extLst>
       <p:ext uri="{BB962C8B-B14F-4D97-AF65-F5344CB8AC3E}">
-        <p14:creationId xmlns:p14="http://schemas.microsoft.com/office/powerpoint/2010/main" val="4285223946"/>
+        <p14:creationId xmlns:p14="http://schemas.microsoft.com/office/powerpoint/2010/main" val="604237516"/>
       </p:ext>
     </p:extLst>
   </p:cSld>

</xml_diff>